<commit_message>
milestone of spatial-temporal methods
</commit_message>
<xml_diff>
--- a/DS_relationships.pptx
+++ b/DS_relationships.pptx
@@ -5,7 +5,7 @@
     <p:sldMasterId id="2147483648" r:id="rId1"/>
   </p:sldMasterIdLst>
   <p:notesMasterIdLst>
-    <p:notesMasterId r:id="rId30"/>
+    <p:notesMasterId r:id="rId31"/>
   </p:notesMasterIdLst>
   <p:sldIdLst>
     <p:sldId id="256" r:id="rId2"/>
@@ -30,12 +30,13 @@
     <p:sldId id="280" r:id="rId21"/>
     <p:sldId id="283" r:id="rId22"/>
     <p:sldId id="282" r:id="rId23"/>
-    <p:sldId id="281" r:id="rId24"/>
-    <p:sldId id="279" r:id="rId25"/>
-    <p:sldId id="278" r:id="rId26"/>
-    <p:sldId id="263" r:id="rId27"/>
-    <p:sldId id="267" r:id="rId28"/>
-    <p:sldId id="268" r:id="rId29"/>
+    <p:sldId id="284" r:id="rId24"/>
+    <p:sldId id="281" r:id="rId25"/>
+    <p:sldId id="279" r:id="rId26"/>
+    <p:sldId id="278" r:id="rId27"/>
+    <p:sldId id="263" r:id="rId28"/>
+    <p:sldId id="267" r:id="rId29"/>
+    <p:sldId id="268" r:id="rId30"/>
   </p:sldIdLst>
   <p:sldSz cx="12192000" cy="6858000"/>
   <p:notesSz cx="6858000" cy="9144000"/>
@@ -6664,7 +6665,7 @@
           <a:p>
             <a:r>
               <a:rPr lang="en-US" dirty="0"/>
-              <a:t>0.567 (*)</a:t>
+              <a:t>0.634 (*)</a:t>
             </a:r>
           </a:p>
         </p:txBody>
@@ -6784,7 +6785,7 @@
           <a:p>
             <a:r>
               <a:rPr lang="en-US" dirty="0"/>
-              <a:t>1.828(*)</a:t>
+              <a:t>1.781(*)</a:t>
             </a:r>
           </a:p>
         </p:txBody>
@@ -7253,7 +7254,7 @@
           <a:p>
             <a:r>
               <a:rPr lang="en-US" dirty="0"/>
-              <a:t>0.182</a:t>
+              <a:t>0.178</a:t>
             </a:r>
           </a:p>
         </p:txBody>
@@ -7373,7 +7374,7 @@
           <a:p>
             <a:r>
               <a:rPr lang="en-US" dirty="0"/>
-              <a:t>0.426(.)</a:t>
+              <a:t>0.421(.)</a:t>
             </a:r>
           </a:p>
         </p:txBody>
@@ -7439,7 +7440,7 @@
         <p:spPr>
           <a:xfrm>
             <a:off x="7161500" y="3540905"/>
-            <a:ext cx="1078923" cy="369332"/>
+            <a:ext cx="1212052" cy="369332"/>
           </a:xfrm>
           <a:prstGeom prst="rect">
             <a:avLst/>
@@ -7454,7 +7455,7 @@
           <a:p>
             <a:r>
               <a:rPr lang="en-US" dirty="0"/>
-              <a:t>-0.717(*)</a:t>
+              <a:t>-0.706 (*)</a:t>
             </a:r>
           </a:p>
         </p:txBody>
@@ -7489,7 +7490,7 @@
           <a:p>
             <a:r>
               <a:rPr lang="en-US" dirty="0"/>
-              <a:t>-0.302</a:t>
+              <a:t>-0.300</a:t>
             </a:r>
           </a:p>
         </p:txBody>
@@ -7524,7 +7525,7 @@
           <a:p>
             <a:r>
               <a:rPr lang="en-US" dirty="0"/>
-              <a:t>0.049</a:t>
+              <a:t>0.011</a:t>
             </a:r>
           </a:p>
         </p:txBody>
@@ -7559,7 +7560,7 @@
           <a:p>
             <a:r>
               <a:rPr lang="en-US" dirty="0"/>
-              <a:t>-0.091</a:t>
+              <a:t>-0.141</a:t>
             </a:r>
           </a:p>
         </p:txBody>
@@ -8415,7 +8416,7 @@
         </p:nvSpPr>
         <p:spPr>
           <a:xfrm>
-            <a:off x="550718" y="3583554"/>
+            <a:off x="536430" y="3583554"/>
             <a:ext cx="1095809" cy="369332"/>
           </a:xfrm>
           <a:prstGeom prst="rect">
@@ -8431,7 +8432,7 @@
           <a:p>
             <a:r>
               <a:rPr lang="en-US" dirty="0"/>
-              <a:t>0.553 (*)</a:t>
+              <a:t>0. 627 (*)</a:t>
             </a:r>
           </a:p>
         </p:txBody>
@@ -8535,8 +8536,8 @@
         </p:nvSpPr>
         <p:spPr>
           <a:xfrm>
-            <a:off x="3839008" y="3591573"/>
-            <a:ext cx="1055976" cy="369332"/>
+            <a:off x="3839007" y="3591573"/>
+            <a:ext cx="1176331" cy="369332"/>
           </a:xfrm>
           <a:prstGeom prst="rect">
             <a:avLst/>
@@ -8551,7 +8552,7 @@
           <a:p>
             <a:r>
               <a:rPr lang="en-US" dirty="0"/>
-              <a:t>0.958(*)</a:t>
+              <a:t>0. 817(*)</a:t>
             </a:r>
           </a:p>
         </p:txBody>
@@ -9020,7 +9021,7 @@
           <a:p>
             <a:r>
               <a:rPr lang="en-US" dirty="0"/>
-              <a:t>0.200</a:t>
+              <a:t>0.196</a:t>
             </a:r>
           </a:p>
         </p:txBody>
@@ -9140,7 +9141,7 @@
           <a:p>
             <a:r>
               <a:rPr lang="en-US" dirty="0"/>
-              <a:t>0.384(*)</a:t>
+              <a:t>0.377(*)</a:t>
             </a:r>
           </a:p>
         </p:txBody>
@@ -9206,7 +9207,7 @@
         <p:spPr>
           <a:xfrm>
             <a:off x="7175788" y="3540905"/>
-            <a:ext cx="1078923" cy="369332"/>
+            <a:ext cx="1207940" cy="369332"/>
           </a:xfrm>
           <a:prstGeom prst="rect">
             <a:avLst/>
@@ -9221,7 +9222,7 @@
           <a:p>
             <a:r>
               <a:rPr lang="en-US" dirty="0"/>
-              <a:t>-0.629(*)</a:t>
+              <a:t>-0.613 (*)</a:t>
             </a:r>
           </a:p>
         </p:txBody>
@@ -9256,7 +9257,7 @@
           <a:p>
             <a:r>
               <a:rPr lang="en-US" dirty="0"/>
-              <a:t>-0.293</a:t>
+              <a:t>-0.291</a:t>
             </a:r>
           </a:p>
         </p:txBody>
@@ -9291,7 +9292,7 @@
           <a:p>
             <a:r>
               <a:rPr lang="en-US" dirty="0"/>
-              <a:t>0.098</a:t>
+              <a:t>0.028</a:t>
             </a:r>
           </a:p>
         </p:txBody>
@@ -9326,7 +9327,7 @@
           <a:p>
             <a:r>
               <a:rPr lang="en-US" dirty="0"/>
-              <a:t>0.032</a:t>
+              <a:t>0.030</a:t>
             </a:r>
           </a:p>
         </p:txBody>
@@ -9733,7 +9734,7 @@
             </a:r>
             <a:r>
               <a:rPr lang="en-US" sz="4400" dirty="0"/>
-              <a:t> —consumers by all data</a:t>
+              <a:t> —consumers by all data—aggregate 5 years</a:t>
             </a:r>
             <a:endParaRPr lang="en-US" dirty="0"/>
           </a:p>
@@ -9766,10 +9767,10 @@
             </a:r>
           </a:p>
           <a:p>
-            <a:endParaRPr lang="en-US"/>
-          </a:p>
-          <a:p>
-            <a:endParaRPr lang="en-US"/>
+            <a:endParaRPr lang="en-US" dirty="0"/>
+          </a:p>
+          <a:p>
+            <a:endParaRPr lang="en-US" dirty="0"/>
           </a:p>
         </p:txBody>
       </p:sp>
@@ -9808,7 +9809,7 @@
           <p:cNvPr id="2" name="Title 1">
             <a:extLst>
               <a:ext uri="{FF2B5EF4-FFF2-40B4-BE49-F238E27FC236}">
-                <a16:creationId xmlns:a16="http://schemas.microsoft.com/office/drawing/2014/main" id="{74C40528-0C5D-E961-A82C-662AFA967790}"/>
+                <a16:creationId xmlns:a16="http://schemas.microsoft.com/office/drawing/2014/main" id="{3212DCD8-7B05-FAF9-6419-67B3C575BDDD}"/>
               </a:ext>
             </a:extLst>
           </p:cNvPr>
@@ -9826,8 +9827,13 @@
           <a:p>
             <a:r>
               <a:rPr lang="en-US" dirty="0"/>
-              <a:t>discussion</a:t>
-            </a:r>
+              <a:t>Temporal method</a:t>
+            </a:r>
+            <a:r>
+              <a:rPr lang="en-US" sz="4400" dirty="0"/>
+              <a:t> —herbivore—aggregate 5 years</a:t>
+            </a:r>
+            <a:endParaRPr lang="en-US" dirty="0"/>
           </a:p>
         </p:txBody>
       </p:sp>
@@ -9836,7 +9842,7 @@
           <p:cNvPr id="3" name="Content Placeholder 2">
             <a:extLst>
               <a:ext uri="{FF2B5EF4-FFF2-40B4-BE49-F238E27FC236}">
-                <a16:creationId xmlns:a16="http://schemas.microsoft.com/office/drawing/2014/main" id="{A2F30638-22FB-322C-23C1-57934AC0BCF3}"/>
+                <a16:creationId xmlns:a16="http://schemas.microsoft.com/office/drawing/2014/main" id="{EBDE292A-FF3F-2211-E92D-7CD80CD5E26A}"/>
               </a:ext>
             </a:extLst>
           </p:cNvPr>
@@ -9852,23 +9858,14 @@
           <a:bodyPr/>
           <a:lstStyle/>
           <a:p>
-            <a:r>
-              <a:rPr lang="en-US" dirty="0"/>
-              <a:t>Do we need get some statistics for herbivore data, so that to show why we got the similar results?</a:t>
-            </a:r>
-          </a:p>
-          <a:p>
-            <a:r>
-              <a:rPr lang="en-US" dirty="0"/>
-              <a:t>I remember that one terrestrial site has no herbivore data??</a:t>
-            </a:r>
+            <a:endParaRPr lang="en-US" dirty="0"/>
           </a:p>
         </p:txBody>
       </p:sp>
     </p:spTree>
     <p:extLst>
       <p:ext uri="{BB962C8B-B14F-4D97-AF65-F5344CB8AC3E}">
-        <p14:creationId xmlns:p14="http://schemas.microsoft.com/office/powerpoint/2010/main" val="972081331"/>
+        <p14:creationId xmlns:p14="http://schemas.microsoft.com/office/powerpoint/2010/main" val="3572650574"/>
       </p:ext>
     </p:extLst>
   </p:cSld>
@@ -9900,7 +9897,7 @@
           <p:cNvPr id="2" name="Title 1">
             <a:extLst>
               <a:ext uri="{FF2B5EF4-FFF2-40B4-BE49-F238E27FC236}">
-                <a16:creationId xmlns:a16="http://schemas.microsoft.com/office/drawing/2014/main" id="{220D86EF-6C4B-92E5-2B30-8C2066764285}"/>
+                <a16:creationId xmlns:a16="http://schemas.microsoft.com/office/drawing/2014/main" id="{74C40528-0C5D-E961-A82C-662AFA967790}"/>
               </a:ext>
             </a:extLst>
           </p:cNvPr>
@@ -9918,7 +9915,7 @@
           <a:p>
             <a:r>
               <a:rPr lang="en-US" dirty="0"/>
-              <a:t>Hypothesis: if we use herbivore, we should see stronger cross-trophic relationships. </a:t>
+              <a:t>discussion</a:t>
             </a:r>
           </a:p>
         </p:txBody>
@@ -9928,7 +9925,7 @@
           <p:cNvPr id="3" name="Content Placeholder 2">
             <a:extLst>
               <a:ext uri="{FF2B5EF4-FFF2-40B4-BE49-F238E27FC236}">
-                <a16:creationId xmlns:a16="http://schemas.microsoft.com/office/drawing/2014/main" id="{052BCA5C-2FBD-4ECC-9182-484A32A1A3A1}"/>
+                <a16:creationId xmlns:a16="http://schemas.microsoft.com/office/drawing/2014/main" id="{A2F30638-22FB-322C-23C1-57934AC0BCF3}"/>
               </a:ext>
             </a:extLst>
           </p:cNvPr>
@@ -9944,14 +9941,23 @@
           <a:bodyPr/>
           <a:lstStyle/>
           <a:p>
-            <a:endParaRPr lang="en-US"/>
+            <a:r>
+              <a:rPr lang="en-US" dirty="0"/>
+              <a:t>Do we need get some statistics for herbivore data, so that to show why we got the similar results?</a:t>
+            </a:r>
+          </a:p>
+          <a:p>
+            <a:r>
+              <a:rPr lang="en-US" dirty="0"/>
+              <a:t>I remember that one terrestrial site has no herbivore data??</a:t>
+            </a:r>
           </a:p>
         </p:txBody>
       </p:sp>
     </p:spTree>
     <p:extLst>
       <p:ext uri="{BB962C8B-B14F-4D97-AF65-F5344CB8AC3E}">
-        <p14:creationId xmlns:p14="http://schemas.microsoft.com/office/powerpoint/2010/main" val="3633649796"/>
+        <p14:creationId xmlns:p14="http://schemas.microsoft.com/office/powerpoint/2010/main" val="972081331"/>
       </p:ext>
     </p:extLst>
   </p:cSld>
@@ -9983,7 +9989,7 @@
           <p:cNvPr id="2" name="Title 1">
             <a:extLst>
               <a:ext uri="{FF2B5EF4-FFF2-40B4-BE49-F238E27FC236}">
-                <a16:creationId xmlns:a16="http://schemas.microsoft.com/office/drawing/2014/main" id="{5C673C10-C4B2-67DF-F296-403F8A00B73B}"/>
+                <a16:creationId xmlns:a16="http://schemas.microsoft.com/office/drawing/2014/main" id="{220D86EF-6C4B-92E5-2B30-8C2066764285}"/>
               </a:ext>
             </a:extLst>
           </p:cNvPr>
@@ -10001,7 +10007,7 @@
           <a:p>
             <a:r>
               <a:rPr lang="en-US" dirty="0"/>
-              <a:t>Spatial and temporal models</a:t>
+              <a:t>Hypothesis: if we use herbivore, we should see stronger cross-trophic relationships. </a:t>
             </a:r>
           </a:p>
         </p:txBody>
@@ -10011,7 +10017,7 @@
           <p:cNvPr id="3" name="Content Placeholder 2">
             <a:extLst>
               <a:ext uri="{FF2B5EF4-FFF2-40B4-BE49-F238E27FC236}">
-                <a16:creationId xmlns:a16="http://schemas.microsoft.com/office/drawing/2014/main" id="{09E2BDB5-CEC1-2596-F097-8D6E6F83218D}"/>
+                <a16:creationId xmlns:a16="http://schemas.microsoft.com/office/drawing/2014/main" id="{052BCA5C-2FBD-4ECC-9182-484A32A1A3A1}"/>
               </a:ext>
             </a:extLst>
           </p:cNvPr>
@@ -10027,14 +10033,14 @@
           <a:bodyPr/>
           <a:lstStyle/>
           <a:p>
-            <a:endParaRPr lang="en-US" dirty="0"/>
+            <a:endParaRPr lang="en-US"/>
           </a:p>
         </p:txBody>
       </p:sp>
     </p:spTree>
     <p:extLst>
       <p:ext uri="{BB962C8B-B14F-4D97-AF65-F5344CB8AC3E}">
-        <p14:creationId xmlns:p14="http://schemas.microsoft.com/office/powerpoint/2010/main" val="3922446988"/>
+        <p14:creationId xmlns:p14="http://schemas.microsoft.com/office/powerpoint/2010/main" val="3633649796"/>
       </p:ext>
     </p:extLst>
   </p:cSld>
@@ -10066,7 +10072,7 @@
           <p:cNvPr id="2" name="Title 1">
             <a:extLst>
               <a:ext uri="{FF2B5EF4-FFF2-40B4-BE49-F238E27FC236}">
-                <a16:creationId xmlns:a16="http://schemas.microsoft.com/office/drawing/2014/main" id="{91FA9736-C547-8129-A322-9235BE8137CE}"/>
+                <a16:creationId xmlns:a16="http://schemas.microsoft.com/office/drawing/2014/main" id="{5C673C10-C4B2-67DF-F296-403F8A00B73B}"/>
               </a:ext>
             </a:extLst>
           </p:cNvPr>
@@ -10084,7 +10090,7 @@
           <a:p>
             <a:r>
               <a:rPr lang="en-US" dirty="0"/>
-              <a:t>What are the hypothesis of across-trophic relationships?</a:t>
+              <a:t>Spatial and temporal models</a:t>
             </a:r>
           </a:p>
         </p:txBody>
@@ -10094,7 +10100,7 @@
           <p:cNvPr id="3" name="Content Placeholder 2">
             <a:extLst>
               <a:ext uri="{FF2B5EF4-FFF2-40B4-BE49-F238E27FC236}">
-                <a16:creationId xmlns:a16="http://schemas.microsoft.com/office/drawing/2014/main" id="{F27CD923-B65E-CAE9-879A-5EC0A9E61C38}"/>
+                <a16:creationId xmlns:a16="http://schemas.microsoft.com/office/drawing/2014/main" id="{09E2BDB5-CEC1-2596-F097-8D6E6F83218D}"/>
               </a:ext>
             </a:extLst>
           </p:cNvPr>
@@ -10110,14 +10116,14 @@
           <a:bodyPr/>
           <a:lstStyle/>
           <a:p>
-            <a:endParaRPr lang="en-US"/>
+            <a:endParaRPr lang="en-US" dirty="0"/>
           </a:p>
         </p:txBody>
       </p:sp>
     </p:spTree>
     <p:extLst>
       <p:ext uri="{BB962C8B-B14F-4D97-AF65-F5344CB8AC3E}">
-        <p14:creationId xmlns:p14="http://schemas.microsoft.com/office/powerpoint/2010/main" val="2606811032"/>
+        <p14:creationId xmlns:p14="http://schemas.microsoft.com/office/powerpoint/2010/main" val="3922446988"/>
       </p:ext>
     </p:extLst>
   </p:cSld>
@@ -10149,6 +10155,89 @@
           <p:cNvPr id="2" name="Title 1">
             <a:extLst>
               <a:ext uri="{FF2B5EF4-FFF2-40B4-BE49-F238E27FC236}">
+                <a16:creationId xmlns:a16="http://schemas.microsoft.com/office/drawing/2014/main" id="{91FA9736-C547-8129-A322-9235BE8137CE}"/>
+              </a:ext>
+            </a:extLst>
+          </p:cNvPr>
+          <p:cNvSpPr>
+            <a:spLocks noGrp="1"/>
+          </p:cNvSpPr>
+          <p:nvPr>
+            <p:ph type="title"/>
+          </p:nvPr>
+        </p:nvSpPr>
+        <p:spPr/>
+        <p:txBody>
+          <a:bodyPr/>
+          <a:lstStyle/>
+          <a:p>
+            <a:r>
+              <a:rPr lang="en-US" dirty="0"/>
+              <a:t>What are the hypothesis of across-trophic relationships?</a:t>
+            </a:r>
+          </a:p>
+        </p:txBody>
+      </p:sp>
+      <p:sp>
+        <p:nvSpPr>
+          <p:cNvPr id="3" name="Content Placeholder 2">
+            <a:extLst>
+              <a:ext uri="{FF2B5EF4-FFF2-40B4-BE49-F238E27FC236}">
+                <a16:creationId xmlns:a16="http://schemas.microsoft.com/office/drawing/2014/main" id="{F27CD923-B65E-CAE9-879A-5EC0A9E61C38}"/>
+              </a:ext>
+            </a:extLst>
+          </p:cNvPr>
+          <p:cNvSpPr>
+            <a:spLocks noGrp="1"/>
+          </p:cNvSpPr>
+          <p:nvPr>
+            <p:ph idx="1"/>
+          </p:nvPr>
+        </p:nvSpPr>
+        <p:spPr/>
+        <p:txBody>
+          <a:bodyPr/>
+          <a:lstStyle/>
+          <a:p>
+            <a:endParaRPr lang="en-US"/>
+          </a:p>
+        </p:txBody>
+      </p:sp>
+    </p:spTree>
+    <p:extLst>
+      <p:ext uri="{BB962C8B-B14F-4D97-AF65-F5344CB8AC3E}">
+        <p14:creationId xmlns:p14="http://schemas.microsoft.com/office/powerpoint/2010/main" val="2606811032"/>
+      </p:ext>
+    </p:extLst>
+  </p:cSld>
+  <p:clrMapOvr>
+    <a:masterClrMapping/>
+  </p:clrMapOvr>
+</p:sld>
+</file>
+
+<file path=ppt/slides/slide28.xml><?xml version="1.0" encoding="utf-8"?>
+<p:sld xmlns:a="http://schemas.openxmlformats.org/drawingml/2006/main" xmlns:r="http://schemas.openxmlformats.org/officeDocument/2006/relationships" xmlns:p="http://schemas.openxmlformats.org/presentationml/2006/main">
+  <p:cSld>
+    <p:spTree>
+      <p:nvGrpSpPr>
+        <p:cNvPr id="1" name=""/>
+        <p:cNvGrpSpPr/>
+        <p:nvPr/>
+      </p:nvGrpSpPr>
+      <p:grpSpPr>
+        <a:xfrm>
+          <a:off x="0" y="0"/>
+          <a:ext cx="0" cy="0"/>
+          <a:chOff x="0" y="0"/>
+          <a:chExt cx="0" cy="0"/>
+        </a:xfrm>
+      </p:grpSpPr>
+      <p:sp>
+        <p:nvSpPr>
+          <p:cNvPr id="2" name="Title 1">
+            <a:extLst>
+              <a:ext uri="{FF2B5EF4-FFF2-40B4-BE49-F238E27FC236}">
                 <a16:creationId xmlns:a16="http://schemas.microsoft.com/office/drawing/2014/main" id="{C61015CC-D9EC-D66F-6043-82FD6F148146}"/>
               </a:ext>
             </a:extLst>
@@ -10219,7 +10308,7 @@
 </p:sld>
 </file>
 
-<file path=ppt/slides/slide28.xml><?xml version="1.0" encoding="utf-8"?>
+<file path=ppt/slides/slide29.xml><?xml version="1.0" encoding="utf-8"?>
 <p:sld xmlns:a="http://schemas.openxmlformats.org/drawingml/2006/main" xmlns:r="http://schemas.openxmlformats.org/officeDocument/2006/relationships" xmlns:p="http://schemas.openxmlformats.org/presentationml/2006/main">
   <p:cSld>
     <p:spTree>

</xml_diff>